<commit_message>
Se agrega diapositiva con los principios SOLID en la presentacion de POO
</commit_message>
<xml_diff>
--- a/Presentaciones/4 - Programacion Orientada a Objetos.pptx
+++ b/Presentaciones/4 - Programacion Orientada a Objetos.pptx
@@ -5,10 +5,10 @@
     <p:sldMasterId id="2147483684" r:id="rId1"/>
   </p:sldMasterIdLst>
   <p:notesMasterIdLst>
-    <p:notesMasterId r:id="rId64"/>
+    <p:notesMasterId r:id="rId65"/>
   </p:notesMasterIdLst>
   <p:handoutMasterIdLst>
-    <p:handoutMasterId r:id="rId65"/>
+    <p:handoutMasterId r:id="rId66"/>
   </p:handoutMasterIdLst>
   <p:sldIdLst>
     <p:sldId id="456" r:id="rId2"/>
@@ -68,11 +68,12 @@
     <p:sldId id="448" r:id="rId56"/>
     <p:sldId id="449" r:id="rId57"/>
     <p:sldId id="453" r:id="rId58"/>
-    <p:sldId id="454" r:id="rId59"/>
-    <p:sldId id="455" r:id="rId60"/>
-    <p:sldId id="435" r:id="rId61"/>
-    <p:sldId id="434" r:id="rId62"/>
-    <p:sldId id="457" r:id="rId63"/>
+    <p:sldId id="458" r:id="rId59"/>
+    <p:sldId id="454" r:id="rId60"/>
+    <p:sldId id="455" r:id="rId61"/>
+    <p:sldId id="435" r:id="rId62"/>
+    <p:sldId id="434" r:id="rId63"/>
+    <p:sldId id="457" r:id="rId64"/>
   </p:sldIdLst>
   <p:sldSz cx="12192000" cy="6858000"/>
   <p:notesSz cx="6858000" cy="9144000"/>
@@ -287,7 +288,7 @@
             <a:fld id="{6A30A114-90B7-4735-863A-42A2304E4B9D}" type="datetimeFigureOut">
               <a:rPr lang="es-AR" smtClean="0"/>
               <a:pPr/>
-              <a:t>16/09/2015</a:t>
+              <a:t>12/04/2017</a:t>
             </a:fld>
             <a:endParaRPr lang="es-AR"/>
           </a:p>
@@ -454,7 +455,7 @@
             <a:fld id="{05FF24BE-F13E-427F-9C3F-26FDFF11FF9E}" type="datetimeFigureOut">
               <a:rPr lang="en-US" smtClean="0"/>
               <a:pPr/>
-              <a:t>16-Sep-15</a:t>
+              <a:t>4/12/2017</a:t>
             </a:fld>
             <a:endParaRPr lang="es-AR"/>
           </a:p>
@@ -8555,12 +8556,7 @@
             <p:ph type="sldImg"/>
           </p:nvPr>
         </p:nvSpPr>
-        <p:spPr>
-          <a:xfrm>
-            <a:off x="381000" y="685800"/>
-            <a:ext cx="6096000" cy="3429000"/>
-          </a:xfrm>
-        </p:spPr>
+        <p:spPr/>
       </p:sp>
       <p:sp>
         <p:nvSpPr>
@@ -8574,14 +8570,68 @@
         </p:nvSpPr>
         <p:spPr/>
         <p:txBody>
-          <a:bodyPr>
-            <a:normAutofit/>
-          </a:bodyPr>
-          <a:lstStyle/>
-          <a:p>
-            <a:endParaRPr lang="es-AR" baseline="0" dirty="0" smtClean="0"/>
-          </a:p>
-          <a:p>
+          <a:bodyPr/>
+          <a:lstStyle/>
+          <a:p>
+            <a:r>
+              <a:rPr lang="en-US" dirty="0" smtClean="0"/>
+              <a:t>SOLID</a:t>
+            </a:r>
+          </a:p>
+          <a:p>
+            <a:r>
+              <a:rPr lang="en-US" dirty="0" smtClean="0"/>
+              <a:t>s - single </a:t>
+            </a:r>
+            <a:r>
+              <a:rPr lang="en-US" dirty="0" err="1" smtClean="0"/>
+              <a:t>responsability</a:t>
+            </a:r>
+            <a:r>
+              <a:rPr lang="en-US" dirty="0" smtClean="0"/>
+              <a:t> - a class should have a single </a:t>
+            </a:r>
+            <a:r>
+              <a:rPr lang="en-US" dirty="0" err="1" smtClean="0"/>
+              <a:t>responsability</a:t>
+            </a:r>
+            <a:endParaRPr lang="en-US" dirty="0" smtClean="0"/>
+          </a:p>
+          <a:p>
+            <a:r>
+              <a:rPr lang="en-US" dirty="0" smtClean="0"/>
+              <a:t>o - open / closed - entities should be open by extension but closed for modification</a:t>
+            </a:r>
+          </a:p>
+          <a:p>
+            <a:r>
+              <a:rPr lang="en-US" dirty="0" smtClean="0"/>
+              <a:t>l - </a:t>
+            </a:r>
+            <a:r>
+              <a:rPr lang="en-US" dirty="0" err="1" smtClean="0"/>
+              <a:t>liskov</a:t>
+            </a:r>
+            <a:r>
+              <a:rPr lang="en-US" dirty="0" smtClean="0"/>
+              <a:t> substitution - object should be replaceable with instances of their subtypes without problems</a:t>
+            </a:r>
+          </a:p>
+          <a:p>
+            <a:r>
+              <a:rPr lang="en-US" dirty="0" err="1" smtClean="0"/>
+              <a:t>i</a:t>
+            </a:r>
+            <a:r>
+              <a:rPr lang="en-US" dirty="0" smtClean="0"/>
+              <a:t> - interface segregation - many specific interfaces are better than a super/general interface</a:t>
+            </a:r>
+          </a:p>
+          <a:p>
+            <a:r>
+              <a:rPr lang="en-US" dirty="0" smtClean="0"/>
+              <a:t>d - dependency inversion - should depend upon abstraction not upon concretions</a:t>
+            </a:r>
             <a:endParaRPr lang="en-US" dirty="0"/>
           </a:p>
         </p:txBody>
@@ -8601,19 +8651,19 @@
           <a:bodyPr/>
           <a:lstStyle/>
           <a:p>
-            <a:fld id="{64B6FF7A-78DA-410B-83EC-4E8D1E3B14D8}" type="slidenum">
-              <a:rPr lang="en-US" smtClean="0"/>
+            <a:fld id="{68B41B73-AFEA-472D-A070-C1821A720A90}" type="slidenum">
+              <a:rPr lang="es-AR" smtClean="0"/>
               <a:pPr/>
               <a:t>58</a:t>
             </a:fld>
-            <a:endParaRPr lang="en-US"/>
+            <a:endParaRPr lang="es-AR"/>
           </a:p>
         </p:txBody>
       </p:sp>
     </p:spTree>
     <p:extLst>
       <p:ext uri="{BB962C8B-B14F-4D97-AF65-F5344CB8AC3E}">
-        <p14:creationId xmlns:p14="http://schemas.microsoft.com/office/powerpoint/2010/main" val="2985964651"/>
+        <p14:creationId xmlns:p14="http://schemas.microsoft.com/office/powerpoint/2010/main" val="495160818"/>
       </p:ext>
     </p:extLst>
   </p:cSld>
@@ -8901,6 +8951,101 @@
               <a:rPr lang="en-US" smtClean="0"/>
               <a:pPr/>
               <a:t>59</a:t>
+            </a:fld>
+            <a:endParaRPr lang="en-US"/>
+          </a:p>
+        </p:txBody>
+      </p:sp>
+    </p:spTree>
+    <p:extLst>
+      <p:ext uri="{BB962C8B-B14F-4D97-AF65-F5344CB8AC3E}">
+        <p14:creationId xmlns:p14="http://schemas.microsoft.com/office/powerpoint/2010/main" val="2985964651"/>
+      </p:ext>
+    </p:extLst>
+  </p:cSld>
+  <p:clrMapOvr>
+    <a:masterClrMapping/>
+  </p:clrMapOvr>
+</p:notes>
+</file>
+
+<file path=ppt/notesSlides/notesSlide51.xml><?xml version="1.0" encoding="utf-8"?>
+<p:notes xmlns:a="http://schemas.openxmlformats.org/drawingml/2006/main" xmlns:r="http://schemas.openxmlformats.org/officeDocument/2006/relationships" xmlns:p="http://schemas.openxmlformats.org/presentationml/2006/main">
+  <p:cSld>
+    <p:spTree>
+      <p:nvGrpSpPr>
+        <p:cNvPr id="1" name=""/>
+        <p:cNvGrpSpPr/>
+        <p:nvPr/>
+      </p:nvGrpSpPr>
+      <p:grpSpPr>
+        <a:xfrm>
+          <a:off x="0" y="0"/>
+          <a:ext cx="0" cy="0"/>
+          <a:chOff x="0" y="0"/>
+          <a:chExt cx="0" cy="0"/>
+        </a:xfrm>
+      </p:grpSpPr>
+      <p:sp>
+        <p:nvSpPr>
+          <p:cNvPr id="2" name="Slide Image Placeholder 1"/>
+          <p:cNvSpPr>
+            <a:spLocks noGrp="1" noRot="1" noChangeAspect="1"/>
+          </p:cNvSpPr>
+          <p:nvPr>
+            <p:ph type="sldImg"/>
+          </p:nvPr>
+        </p:nvSpPr>
+        <p:spPr>
+          <a:xfrm>
+            <a:off x="381000" y="685800"/>
+            <a:ext cx="6096000" cy="3429000"/>
+          </a:xfrm>
+        </p:spPr>
+      </p:sp>
+      <p:sp>
+        <p:nvSpPr>
+          <p:cNvPr id="3" name="Notes Placeholder 2"/>
+          <p:cNvSpPr>
+            <a:spLocks noGrp="1"/>
+          </p:cNvSpPr>
+          <p:nvPr>
+            <p:ph type="body" idx="1"/>
+          </p:nvPr>
+        </p:nvSpPr>
+        <p:spPr/>
+        <p:txBody>
+          <a:bodyPr>
+            <a:normAutofit/>
+          </a:bodyPr>
+          <a:lstStyle/>
+          <a:p>
+            <a:endParaRPr lang="es-AR" baseline="0" dirty="0" smtClean="0"/>
+          </a:p>
+          <a:p>
+            <a:endParaRPr lang="en-US" dirty="0"/>
+          </a:p>
+        </p:txBody>
+      </p:sp>
+      <p:sp>
+        <p:nvSpPr>
+          <p:cNvPr id="4" name="Slide Number Placeholder 3"/>
+          <p:cNvSpPr>
+            <a:spLocks noGrp="1"/>
+          </p:cNvSpPr>
+          <p:nvPr>
+            <p:ph type="sldNum" sz="quarter" idx="10"/>
+          </p:nvPr>
+        </p:nvSpPr>
+        <p:spPr/>
+        <p:txBody>
+          <a:bodyPr/>
+          <a:lstStyle/>
+          <a:p>
+            <a:fld id="{64B6FF7A-78DA-410B-83EC-4E8D1E3B14D8}" type="slidenum">
+              <a:rPr lang="en-US" smtClean="0"/>
+              <a:pPr/>
+              <a:t>60</a:t>
             </a:fld>
             <a:endParaRPr lang="en-US"/>
           </a:p>
@@ -11247,7 +11392,7 @@
             <a:fld id="{1D8BD707-D9CF-40AE-B4C6-C98DA3205C09}" type="datetimeFigureOut">
               <a:rPr lang="en-US" smtClean="0"/>
               <a:pPr/>
-              <a:t>16-Sep-15</a:t>
+              <a:t>4/12/2017</a:t>
             </a:fld>
             <a:endParaRPr lang="en-US"/>
           </a:p>
@@ -30103,7 +30248,7 @@
       </p:grpSpPr>
       <p:sp>
         <p:nvSpPr>
-          <p:cNvPr id="3" name="Content Placeholder 2"/>
+          <p:cNvPr id="11" name="Content Placeholder 10"/>
           <p:cNvSpPr>
             <a:spLocks noGrp="1"/>
           </p:cNvSpPr>
@@ -30111,122 +30256,144 @@
             <p:ph idx="1"/>
           </p:nvPr>
         </p:nvSpPr>
-        <p:spPr>
-          <a:xfrm>
-            <a:off x="1828800" y="381000"/>
-            <a:ext cx="8458200" cy="914400"/>
-          </a:xfrm>
-        </p:spPr>
+        <p:spPr/>
         <p:txBody>
           <a:bodyPr>
             <a:normAutofit/>
           </a:bodyPr>
           <a:lstStyle/>
           <a:p>
-            <a:pPr>
-              <a:buNone/>
-            </a:pPr>
-            <a:r>
-              <a:rPr lang="es-AR" sz="4000" dirty="0">
-                <a:solidFill>
-                  <a:schemeClr val="accent5">
-                    <a:lumMod val="75000"/>
-                  </a:schemeClr>
-                </a:solidFill>
-              </a:rPr>
-              <a:t>Ejercicio para modelar con objetos</a:t>
-            </a:r>
-          </a:p>
-          <a:p>
-            <a:pPr>
-              <a:buNone/>
-            </a:pPr>
-            <a:endParaRPr lang="es-AR" sz="4000" dirty="0"/>
-          </a:p>
-        </p:txBody>
-      </p:sp>
-      <p:pic>
-        <p:nvPicPr>
-          <p:cNvPr id="10242" name="Picture 2" descr="http://www.gucros.com/imagenes/foto004.jpg"/>
-          <p:cNvPicPr>
-            <a:picLocks noChangeAspect="1" noChangeArrowheads="1"/>
-          </p:cNvPicPr>
+            <a:r>
+              <a:rPr lang="es-ES" sz="4000" dirty="0" smtClean="0"/>
+              <a:t>S. Single </a:t>
+            </a:r>
+            <a:r>
+              <a:rPr lang="es-ES" sz="4000" dirty="0" err="1" smtClean="0"/>
+              <a:t>responsability</a:t>
+            </a:r>
+            <a:endParaRPr lang="es-ES" sz="4000" dirty="0" smtClean="0"/>
+          </a:p>
+          <a:p>
+            <a:r>
+              <a:rPr lang="es-ES" sz="4000" dirty="0" smtClean="0"/>
+              <a:t>O. Open/</a:t>
+            </a:r>
+            <a:r>
+              <a:rPr lang="es-ES" sz="4000" dirty="0" err="1" smtClean="0"/>
+              <a:t>Close</a:t>
+            </a:r>
+            <a:endParaRPr lang="es-ES" sz="4000" dirty="0" smtClean="0"/>
+          </a:p>
+          <a:p>
+            <a:r>
+              <a:rPr lang="es-ES" sz="4000" dirty="0" smtClean="0"/>
+              <a:t>L. </a:t>
+            </a:r>
+            <a:r>
+              <a:rPr lang="es-ES" sz="4000" dirty="0" err="1" smtClean="0"/>
+              <a:t>Liskov</a:t>
+            </a:r>
+            <a:r>
+              <a:rPr lang="es-ES" sz="4000" dirty="0" smtClean="0"/>
+              <a:t> </a:t>
+            </a:r>
+            <a:r>
+              <a:rPr lang="es-ES" sz="4000" dirty="0" err="1"/>
+              <a:t>s</a:t>
+            </a:r>
+            <a:r>
+              <a:rPr lang="es-ES" sz="4000" dirty="0" err="1" smtClean="0"/>
+              <a:t>ubstitution</a:t>
+            </a:r>
+            <a:endParaRPr lang="es-ES" sz="4000" dirty="0" smtClean="0"/>
+          </a:p>
+          <a:p>
+            <a:r>
+              <a:rPr lang="es-ES" sz="4000" dirty="0" smtClean="0"/>
+              <a:t>I. Interface </a:t>
+            </a:r>
+            <a:r>
+              <a:rPr lang="es-ES" sz="4000" dirty="0" err="1" smtClean="0"/>
+              <a:t>segregation</a:t>
+            </a:r>
+            <a:endParaRPr lang="es-ES" sz="4000" dirty="0" smtClean="0"/>
+          </a:p>
+          <a:p>
+            <a:r>
+              <a:rPr lang="es-ES" sz="4000" dirty="0" smtClean="0"/>
+              <a:t>D. </a:t>
+            </a:r>
+            <a:r>
+              <a:rPr lang="es-ES" sz="4000" dirty="0" err="1" smtClean="0"/>
+              <a:t>Dependency</a:t>
+            </a:r>
+            <a:r>
+              <a:rPr lang="es-ES" sz="4000" dirty="0" smtClean="0"/>
+              <a:t> </a:t>
+            </a:r>
+            <a:r>
+              <a:rPr lang="es-ES" sz="4000" dirty="0" err="1" smtClean="0"/>
+              <a:t>inversion</a:t>
+            </a:r>
+            <a:r>
+              <a:rPr lang="es-ES" sz="4000" dirty="0" smtClean="0"/>
+              <a:t> </a:t>
+            </a:r>
+            <a:endParaRPr lang="en-US" sz="4000" dirty="0"/>
+          </a:p>
+        </p:txBody>
+      </p:sp>
+      <p:sp>
+        <p:nvSpPr>
+          <p:cNvPr id="14" name="TextBox 13"/>
+          <p:cNvSpPr txBox="1"/>
           <p:nvPr/>
-        </p:nvPicPr>
-        <p:blipFill>
-          <a:blip r:embed="rId3" cstate="print"/>
-          <a:srcRect/>
-          <a:stretch>
-            <a:fillRect/>
-          </a:stretch>
-        </p:blipFill>
-        <p:spPr bwMode="auto">
-          <a:xfrm>
-            <a:off x="5410200" y="1524000"/>
-            <a:ext cx="5257800" cy="3080742"/>
+        </p:nvSpPr>
+        <p:spPr>
+          <a:xfrm>
+            <a:off x="1529733" y="0"/>
+            <a:ext cx="9144000" cy="769441"/>
           </a:xfrm>
           <a:prstGeom prst="rect">
             <a:avLst/>
           </a:prstGeom>
           <a:noFill/>
         </p:spPr>
-      </p:pic>
-      <p:pic>
-        <p:nvPicPr>
-          <p:cNvPr id="10244" name="Picture 4" descr="http://www.siarweb.com/imagenes/Code_128_Barcode_Graphic.jpg"/>
-          <p:cNvPicPr>
-            <a:picLocks noChangeAspect="1" noChangeArrowheads="1"/>
-          </p:cNvPicPr>
-          <p:nvPr/>
-        </p:nvPicPr>
-        <p:blipFill>
-          <a:blip r:embed="rId4" cstate="print"/>
-          <a:srcRect/>
-          <a:stretch>
-            <a:fillRect/>
-          </a:stretch>
-        </p:blipFill>
-        <p:spPr bwMode="auto">
-          <a:xfrm>
-            <a:off x="1524000" y="3915468"/>
-            <a:ext cx="4572000" cy="2942533"/>
-          </a:xfrm>
-          <a:prstGeom prst="rect">
-            <a:avLst/>
-          </a:prstGeom>
-          <a:noFill/>
-        </p:spPr>
-      </p:pic>
-      <p:pic>
-        <p:nvPicPr>
-          <p:cNvPr id="10246" name="Picture 6" descr="http://latarjetavip.com/media/crop/120/80/Listados/Tarjeta%20VIP%20Promociones/tarjetavippromo03.jpg"/>
-          <p:cNvPicPr>
-            <a:picLocks noChangeAspect="1" noChangeArrowheads="1"/>
-          </p:cNvPicPr>
-          <p:nvPr/>
-        </p:nvPicPr>
-        <p:blipFill>
-          <a:blip r:embed="rId5" cstate="print"/>
-          <a:srcRect/>
-          <a:stretch>
-            <a:fillRect/>
-          </a:stretch>
-        </p:blipFill>
-        <p:spPr bwMode="auto">
-          <a:xfrm>
-            <a:off x="7162800" y="4521200"/>
-            <a:ext cx="3505200" cy="2336800"/>
-          </a:xfrm>
-          <a:prstGeom prst="rect">
-            <a:avLst/>
-          </a:prstGeom>
-          <a:noFill/>
-        </p:spPr>
-      </p:pic>
+        <p:txBody>
+          <a:bodyPr wrap="square" rtlCol="0">
+            <a:spAutoFit/>
+          </a:bodyPr>
+          <a:lstStyle/>
+          <a:p>
+            <a:pPr algn="ctr"/>
+            <a:r>
+              <a:rPr lang="es-AR" sz="4400" dirty="0" smtClean="0">
+                <a:solidFill>
+                  <a:schemeClr val="accent5">
+                    <a:lumMod val="50000"/>
+                  </a:schemeClr>
+                </a:solidFill>
+                <a:latin typeface="Arial" pitchFamily="34" charset="0"/>
+                <a:cs typeface="Arial" pitchFamily="34" charset="0"/>
+              </a:rPr>
+              <a:t>Principios SOLID</a:t>
+            </a:r>
+            <a:endParaRPr lang="es-AR" sz="4400" dirty="0">
+              <a:solidFill>
+                <a:schemeClr val="accent5">
+                  <a:lumMod val="50000"/>
+                </a:schemeClr>
+              </a:solidFill>
+              <a:latin typeface="Arial" pitchFamily="34" charset="0"/>
+              <a:cs typeface="Arial" pitchFamily="34" charset="0"/>
+            </a:endParaRPr>
+          </a:p>
+        </p:txBody>
+      </p:sp>
     </p:spTree>
     <p:extLst>
       <p:ext uri="{BB962C8B-B14F-4D97-AF65-F5344CB8AC3E}">
-        <p14:creationId xmlns:p14="http://schemas.microsoft.com/office/powerpoint/2010/main" val="344560156"/>
+        <p14:creationId xmlns:p14="http://schemas.microsoft.com/office/powerpoint/2010/main" val="2228032639"/>
       </p:ext>
     </p:extLst>
   </p:cSld>
@@ -30272,33 +30439,21 @@
         </p:nvSpPr>
         <p:spPr>
           <a:xfrm>
-            <a:off x="609600" y="152400"/>
-            <a:ext cx="11277600" cy="6400800"/>
+            <a:off x="1828800" y="381000"/>
+            <a:ext cx="8458200" cy="914400"/>
           </a:xfrm>
         </p:spPr>
         <p:txBody>
           <a:bodyPr>
-            <a:normAutofit fontScale="62500" lnSpcReduction="20000"/>
+            <a:normAutofit/>
           </a:bodyPr>
           <a:lstStyle/>
           <a:p>
             <a:pPr>
               <a:buNone/>
             </a:pPr>
-            <a:endParaRPr lang="es-AR" sz="2200" dirty="0">
-              <a:solidFill>
-                <a:schemeClr val="accent5">
-                  <a:lumMod val="75000"/>
-                </a:schemeClr>
-              </a:solidFill>
-            </a:endParaRPr>
-          </a:p>
-          <a:p>
-            <a:pPr>
-              <a:buNone/>
-            </a:pPr>
-            <a:r>
-              <a:rPr lang="es-AR" sz="6400" dirty="0">
+            <a:r>
+              <a:rPr lang="es-AR" sz="4000" dirty="0">
                 <a:solidFill>
                   <a:schemeClr val="accent5">
                     <a:lumMod val="75000"/>
@@ -30314,157 +30469,90 @@
             </a:pPr>
             <a:endParaRPr lang="es-AR" sz="4000" dirty="0"/>
           </a:p>
-          <a:p>
-            <a:pPr>
-              <a:buFontTx/>
-              <a:buChar char="-"/>
-            </a:pPr>
-            <a:r>
-              <a:rPr lang="es-AR" sz="4000" dirty="0"/>
-              <a:t>Escenario:</a:t>
-            </a:r>
-            <a:r>
-              <a:rPr lang="es-AR" sz="3200" dirty="0"/>
-              <a:t> supermercado, en la caja se están escaneando productos, se va generando una factura que cambia su costo total por cada nuevo producto escaneado, en todo momento se cuanto voy gastando. Los productos se escanean en cualquier orden. </a:t>
-            </a:r>
-          </a:p>
-          <a:p>
-            <a:pPr>
-              <a:buFontTx/>
-              <a:buChar char="-"/>
-            </a:pPr>
-            <a:endParaRPr lang="es-AR" sz="3200" dirty="0"/>
-          </a:p>
-          <a:p>
-            <a:pPr>
-              <a:buFontTx/>
-              <a:buChar char="-"/>
-            </a:pPr>
-            <a:r>
-              <a:rPr lang="es-AR" sz="4000" dirty="0"/>
-              <a:t>Promociones: </a:t>
-            </a:r>
-            <a:r>
-              <a:rPr lang="es-AR" sz="2900" dirty="0"/>
-              <a:t>(van cambiando todos los días)</a:t>
-            </a:r>
-          </a:p>
-          <a:p>
-            <a:pPr lvl="3">
-              <a:buFontTx/>
-              <a:buChar char="-"/>
-            </a:pPr>
-            <a:r>
-              <a:rPr lang="es-AR" sz="2900" dirty="0"/>
-              <a:t>2 x 1 </a:t>
-            </a:r>
-          </a:p>
-          <a:p>
-            <a:pPr lvl="3">
-              <a:buFontTx/>
-              <a:buChar char="-"/>
-            </a:pPr>
-            <a:r>
-              <a:rPr lang="es-AR" sz="2900" dirty="0"/>
-              <a:t>3 x 2</a:t>
-            </a:r>
-          </a:p>
-          <a:p>
-            <a:pPr lvl="3">
-              <a:buFontTx/>
-              <a:buChar char="-"/>
-            </a:pPr>
-            <a:r>
-              <a:rPr lang="es-AR" sz="2900" dirty="0"/>
-              <a:t>si llevas 3, 20% de descuento sobre los 3</a:t>
-            </a:r>
-          </a:p>
-          <a:p>
-            <a:pPr lvl="3">
-              <a:buFontTx/>
-              <a:buChar char="-"/>
-            </a:pPr>
-            <a:r>
-              <a:rPr lang="es-AR" sz="2900" dirty="0"/>
-              <a:t>si llevas 2, 50% sobre el segundo</a:t>
-            </a:r>
-          </a:p>
-          <a:p>
-            <a:pPr lvl="3">
-              <a:buFontTx/>
-              <a:buChar char="-"/>
-            </a:pPr>
-            <a:r>
-              <a:rPr lang="es-AR" sz="2900" dirty="0"/>
-              <a:t>en determinados días 10% de descuento sobre todos los productos no </a:t>
-            </a:r>
-            <a:r>
-              <a:rPr lang="es-AR" sz="2900" dirty="0" err="1"/>
-              <a:t>promocionables</a:t>
-            </a:r>
-            <a:r>
-              <a:rPr lang="es-AR" sz="2900" dirty="0"/>
-              <a:t>, o sobre todos los productos</a:t>
-            </a:r>
-          </a:p>
-          <a:p>
-            <a:pPr lvl="3">
-              <a:buFontTx/>
-              <a:buChar char="-"/>
-            </a:pPr>
-            <a:r>
-              <a:rPr lang="es-AR" sz="2900" dirty="0"/>
-              <a:t>etc.</a:t>
-            </a:r>
-          </a:p>
-          <a:p>
-            <a:pPr>
-              <a:buFontTx/>
-              <a:buChar char="-"/>
-            </a:pPr>
-            <a:endParaRPr lang="es-AR" sz="4000" dirty="0"/>
-          </a:p>
-          <a:p>
-            <a:pPr>
-              <a:buFontTx/>
-              <a:buChar char="-"/>
-            </a:pPr>
-            <a:r>
-              <a:rPr lang="es-AR" sz="4000" dirty="0"/>
-              <a:t>Resultado: </a:t>
-            </a:r>
-            <a:r>
-              <a:rPr lang="es-AR" sz="2800" dirty="0"/>
-              <a:t>una factura que contempla promociones y descuentos.</a:t>
-            </a:r>
-          </a:p>
-          <a:p>
-            <a:pPr>
-              <a:buNone/>
-            </a:pPr>
-            <a:endParaRPr lang="es-AR" sz="4000" dirty="0"/>
-          </a:p>
-          <a:p>
-            <a:pPr>
-              <a:buNone/>
-            </a:pPr>
-            <a:endParaRPr lang="es-AR" sz="4000" dirty="0"/>
-          </a:p>
-          <a:p>
-            <a:endParaRPr lang="es-AR" sz="4000" dirty="0"/>
-          </a:p>
-          <a:p>
-            <a:endParaRPr lang="es-AR" dirty="0" smtClean="0"/>
-          </a:p>
-          <a:p>
-            <a:endParaRPr lang="en-US" dirty="0"/>
-          </a:p>
-        </p:txBody>
-      </p:sp>
+        </p:txBody>
+      </p:sp>
+      <p:pic>
+        <p:nvPicPr>
+          <p:cNvPr id="10242" name="Picture 2" descr="http://www.gucros.com/imagenes/foto004.jpg"/>
+          <p:cNvPicPr>
+            <a:picLocks noChangeAspect="1" noChangeArrowheads="1"/>
+          </p:cNvPicPr>
+          <p:nvPr/>
+        </p:nvPicPr>
+        <p:blipFill>
+          <a:blip r:embed="rId3" cstate="print"/>
+          <a:srcRect/>
+          <a:stretch>
+            <a:fillRect/>
+          </a:stretch>
+        </p:blipFill>
+        <p:spPr bwMode="auto">
+          <a:xfrm>
+            <a:off x="5410200" y="1524000"/>
+            <a:ext cx="5257800" cy="3080742"/>
+          </a:xfrm>
+          <a:prstGeom prst="rect">
+            <a:avLst/>
+          </a:prstGeom>
+          <a:noFill/>
+        </p:spPr>
+      </p:pic>
+      <p:pic>
+        <p:nvPicPr>
+          <p:cNvPr id="10244" name="Picture 4" descr="http://www.siarweb.com/imagenes/Code_128_Barcode_Graphic.jpg"/>
+          <p:cNvPicPr>
+            <a:picLocks noChangeAspect="1" noChangeArrowheads="1"/>
+          </p:cNvPicPr>
+          <p:nvPr/>
+        </p:nvPicPr>
+        <p:blipFill>
+          <a:blip r:embed="rId4" cstate="print"/>
+          <a:srcRect/>
+          <a:stretch>
+            <a:fillRect/>
+          </a:stretch>
+        </p:blipFill>
+        <p:spPr bwMode="auto">
+          <a:xfrm>
+            <a:off x="1524000" y="3915468"/>
+            <a:ext cx="4572000" cy="2942533"/>
+          </a:xfrm>
+          <a:prstGeom prst="rect">
+            <a:avLst/>
+          </a:prstGeom>
+          <a:noFill/>
+        </p:spPr>
+      </p:pic>
+      <p:pic>
+        <p:nvPicPr>
+          <p:cNvPr id="10246" name="Picture 6" descr="http://latarjetavip.com/media/crop/120/80/Listados/Tarjeta%20VIP%20Promociones/tarjetavippromo03.jpg"/>
+          <p:cNvPicPr>
+            <a:picLocks noChangeAspect="1" noChangeArrowheads="1"/>
+          </p:cNvPicPr>
+          <p:nvPr/>
+        </p:nvPicPr>
+        <p:blipFill>
+          <a:blip r:embed="rId5" cstate="print"/>
+          <a:srcRect/>
+          <a:stretch>
+            <a:fillRect/>
+          </a:stretch>
+        </p:blipFill>
+        <p:spPr bwMode="auto">
+          <a:xfrm>
+            <a:off x="7162800" y="4521200"/>
+            <a:ext cx="3505200" cy="2336800"/>
+          </a:xfrm>
+          <a:prstGeom prst="rect">
+            <a:avLst/>
+          </a:prstGeom>
+          <a:noFill/>
+        </p:spPr>
+      </p:pic>
     </p:spTree>
     <p:extLst>
       <p:ext uri="{BB962C8B-B14F-4D97-AF65-F5344CB8AC3E}">
-        <p14:creationId xmlns:p14="http://schemas.microsoft.com/office/powerpoint/2010/main" val="2160906561"/>
+        <p14:creationId xmlns:p14="http://schemas.microsoft.com/office/powerpoint/2010/main" val="344560156"/>
       </p:ext>
     </p:extLst>
   </p:cSld>
@@ -30601,6 +30689,244 @@
             <p:ph idx="1"/>
           </p:nvPr>
         </p:nvSpPr>
+        <p:spPr>
+          <a:xfrm>
+            <a:off x="609600" y="152400"/>
+            <a:ext cx="11277600" cy="6400800"/>
+          </a:xfrm>
+        </p:spPr>
+        <p:txBody>
+          <a:bodyPr>
+            <a:normAutofit fontScale="62500" lnSpcReduction="20000"/>
+          </a:bodyPr>
+          <a:lstStyle/>
+          <a:p>
+            <a:pPr>
+              <a:buNone/>
+            </a:pPr>
+            <a:endParaRPr lang="es-AR" sz="2200" dirty="0">
+              <a:solidFill>
+                <a:schemeClr val="accent5">
+                  <a:lumMod val="75000"/>
+                </a:schemeClr>
+              </a:solidFill>
+            </a:endParaRPr>
+          </a:p>
+          <a:p>
+            <a:pPr>
+              <a:buNone/>
+            </a:pPr>
+            <a:r>
+              <a:rPr lang="es-AR" sz="6400" dirty="0">
+                <a:solidFill>
+                  <a:schemeClr val="accent5">
+                    <a:lumMod val="75000"/>
+                  </a:schemeClr>
+                </a:solidFill>
+              </a:rPr>
+              <a:t>Ejercicio para modelar con objetos</a:t>
+            </a:r>
+          </a:p>
+          <a:p>
+            <a:pPr>
+              <a:buNone/>
+            </a:pPr>
+            <a:endParaRPr lang="es-AR" sz="4000" dirty="0"/>
+          </a:p>
+          <a:p>
+            <a:pPr>
+              <a:buFontTx/>
+              <a:buChar char="-"/>
+            </a:pPr>
+            <a:r>
+              <a:rPr lang="es-AR" sz="4000" dirty="0"/>
+              <a:t>Escenario:</a:t>
+            </a:r>
+            <a:r>
+              <a:rPr lang="es-AR" sz="3200" dirty="0"/>
+              <a:t> supermercado, en la caja se están escaneando productos, se va generando una factura que cambia su costo total por cada nuevo producto escaneado, en todo momento se cuanto voy gastando. Los productos se escanean en cualquier orden. </a:t>
+            </a:r>
+          </a:p>
+          <a:p>
+            <a:pPr>
+              <a:buFontTx/>
+              <a:buChar char="-"/>
+            </a:pPr>
+            <a:endParaRPr lang="es-AR" sz="3200" dirty="0"/>
+          </a:p>
+          <a:p>
+            <a:pPr>
+              <a:buFontTx/>
+              <a:buChar char="-"/>
+            </a:pPr>
+            <a:r>
+              <a:rPr lang="es-AR" sz="4000" dirty="0"/>
+              <a:t>Promociones: </a:t>
+            </a:r>
+            <a:r>
+              <a:rPr lang="es-AR" sz="2900" dirty="0"/>
+              <a:t>(van cambiando todos los días)</a:t>
+            </a:r>
+          </a:p>
+          <a:p>
+            <a:pPr lvl="3">
+              <a:buFontTx/>
+              <a:buChar char="-"/>
+            </a:pPr>
+            <a:r>
+              <a:rPr lang="es-AR" sz="2900" dirty="0"/>
+              <a:t>2 x 1 </a:t>
+            </a:r>
+          </a:p>
+          <a:p>
+            <a:pPr lvl="3">
+              <a:buFontTx/>
+              <a:buChar char="-"/>
+            </a:pPr>
+            <a:r>
+              <a:rPr lang="es-AR" sz="2900" dirty="0"/>
+              <a:t>3 x 2</a:t>
+            </a:r>
+          </a:p>
+          <a:p>
+            <a:pPr lvl="3">
+              <a:buFontTx/>
+              <a:buChar char="-"/>
+            </a:pPr>
+            <a:r>
+              <a:rPr lang="es-AR" sz="2900" dirty="0"/>
+              <a:t>si llevas 3, 20% de descuento sobre los 3</a:t>
+            </a:r>
+          </a:p>
+          <a:p>
+            <a:pPr lvl="3">
+              <a:buFontTx/>
+              <a:buChar char="-"/>
+            </a:pPr>
+            <a:r>
+              <a:rPr lang="es-AR" sz="2900" dirty="0"/>
+              <a:t>si llevas 2, 50% sobre el segundo</a:t>
+            </a:r>
+          </a:p>
+          <a:p>
+            <a:pPr lvl="3">
+              <a:buFontTx/>
+              <a:buChar char="-"/>
+            </a:pPr>
+            <a:r>
+              <a:rPr lang="es-AR" sz="2900" dirty="0"/>
+              <a:t>en determinados días 10% de descuento sobre todos los productos no </a:t>
+            </a:r>
+            <a:r>
+              <a:rPr lang="es-AR" sz="2900" dirty="0" err="1"/>
+              <a:t>promocionables</a:t>
+            </a:r>
+            <a:r>
+              <a:rPr lang="es-AR" sz="2900" dirty="0"/>
+              <a:t>, o sobre todos los productos</a:t>
+            </a:r>
+          </a:p>
+          <a:p>
+            <a:pPr lvl="3">
+              <a:buFontTx/>
+              <a:buChar char="-"/>
+            </a:pPr>
+            <a:r>
+              <a:rPr lang="es-AR" sz="2900" dirty="0"/>
+              <a:t>etc.</a:t>
+            </a:r>
+          </a:p>
+          <a:p>
+            <a:pPr>
+              <a:buFontTx/>
+              <a:buChar char="-"/>
+            </a:pPr>
+            <a:endParaRPr lang="es-AR" sz="4000" dirty="0"/>
+          </a:p>
+          <a:p>
+            <a:pPr>
+              <a:buFontTx/>
+              <a:buChar char="-"/>
+            </a:pPr>
+            <a:r>
+              <a:rPr lang="es-AR" sz="4000" dirty="0"/>
+              <a:t>Resultado: </a:t>
+            </a:r>
+            <a:r>
+              <a:rPr lang="es-AR" sz="2800" dirty="0"/>
+              <a:t>una factura que contempla promociones y descuentos.</a:t>
+            </a:r>
+          </a:p>
+          <a:p>
+            <a:pPr>
+              <a:buNone/>
+            </a:pPr>
+            <a:endParaRPr lang="es-AR" sz="4000" dirty="0"/>
+          </a:p>
+          <a:p>
+            <a:pPr>
+              <a:buNone/>
+            </a:pPr>
+            <a:endParaRPr lang="es-AR" sz="4000" dirty="0"/>
+          </a:p>
+          <a:p>
+            <a:endParaRPr lang="es-AR" sz="4000" dirty="0"/>
+          </a:p>
+          <a:p>
+            <a:endParaRPr lang="es-AR" dirty="0" smtClean="0"/>
+          </a:p>
+          <a:p>
+            <a:endParaRPr lang="en-US" dirty="0"/>
+          </a:p>
+        </p:txBody>
+      </p:sp>
+    </p:spTree>
+    <p:extLst>
+      <p:ext uri="{BB962C8B-B14F-4D97-AF65-F5344CB8AC3E}">
+        <p14:creationId xmlns:p14="http://schemas.microsoft.com/office/powerpoint/2010/main" val="2160906561"/>
+      </p:ext>
+    </p:extLst>
+  </p:cSld>
+  <p:clrMapOvr>
+    <a:masterClrMapping/>
+  </p:clrMapOvr>
+  <p:timing>
+    <p:tnLst>
+      <p:par>
+        <p:cTn id="1" dur="indefinite" restart="never" nodeType="tmRoot"/>
+      </p:par>
+    </p:tnLst>
+  </p:timing>
+</p:sld>
+</file>
+
+<file path=ppt/slides/slide61.xml><?xml version="1.0" encoding="utf-8"?>
+<p:sld xmlns:a="http://schemas.openxmlformats.org/drawingml/2006/main" xmlns:r="http://schemas.openxmlformats.org/officeDocument/2006/relationships" xmlns:p="http://schemas.openxmlformats.org/presentationml/2006/main">
+  <p:cSld>
+    <p:spTree>
+      <p:nvGrpSpPr>
+        <p:cNvPr id="1" name=""/>
+        <p:cNvGrpSpPr/>
+        <p:nvPr/>
+      </p:nvGrpSpPr>
+      <p:grpSpPr>
+        <a:xfrm>
+          <a:off x="0" y="0"/>
+          <a:ext cx="0" cy="0"/>
+          <a:chOff x="0" y="0"/>
+          <a:chExt cx="0" cy="0"/>
+        </a:xfrm>
+      </p:grpSpPr>
+      <p:sp>
+        <p:nvSpPr>
+          <p:cNvPr id="3" name="Content Placeholder 2"/>
+          <p:cNvSpPr>
+            <a:spLocks noGrp="1"/>
+          </p:cNvSpPr>
+          <p:nvPr>
+            <p:ph idx="1"/>
+          </p:nvPr>
+        </p:nvSpPr>
         <p:spPr/>
         <p:txBody>
           <a:bodyPr/>
@@ -30668,7 +30994,7 @@
 </p:sld>
 </file>
 
-<file path=ppt/slides/slide61.xml><?xml version="1.0" encoding="utf-8"?>
+<file path=ppt/slides/slide62.xml><?xml version="1.0" encoding="utf-8"?>
 <p:sld xmlns:a="http://schemas.openxmlformats.org/drawingml/2006/main" xmlns:r="http://schemas.openxmlformats.org/officeDocument/2006/relationships" xmlns:p="http://schemas.openxmlformats.org/presentationml/2006/main">
   <p:cSld>
     <p:spTree>
@@ -30814,7 +31140,7 @@
 </p:sld>
 </file>
 
-<file path=ppt/slides/slide62.xml><?xml version="1.0" encoding="utf-8"?>
+<file path=ppt/slides/slide63.xml><?xml version="1.0" encoding="utf-8"?>
 <p:sld xmlns:a="http://schemas.openxmlformats.org/drawingml/2006/main" xmlns:r="http://schemas.openxmlformats.org/officeDocument/2006/relationships" xmlns:p="http://schemas.openxmlformats.org/presentationml/2006/main">
   <p:cSld>
     <p:spTree>

</xml_diff>